<commit_message>
add zone to shipping and dish sticker
</commit_message>
<xml_diff>
--- a/template/Dish_Sticker_Template_Barcode.pptx
+++ b/template/Dish_Sticker_Template_Barcode.pptx
@@ -1903,9 +1903,13 @@
   <p:cSld>
     <p:bg>
       <p:bgPr>
-        <a:solidFill>
-          <a:srgbClr val="FFFFFF"/>
-        </a:solidFill>
+        <a:blipFill dpi="0" rotWithShape="1">
+          <a:blip r:embed="rId11"/>
+          <a:srcRect/>
+          <a:stretch>
+            <a:fillRect/>
+          </a:stretch>
+        </a:blipFill>
         <a:effectLst/>
       </p:bgPr>
     </p:bg>
@@ -2815,7 +2819,7 @@
       </p:grpSpPr>
       <p:sp>
         <p:nvSpPr>
-          <p:cNvPr id="94" name="TextBox 10"/>
+          <p:cNvPr id="94" name="ingredients"/>
           <p:cNvSpPr txBox="1"/>
           <p:nvPr/>
         </p:nvSpPr>
@@ -2863,7 +2867,7 @@
       </p:sp>
       <p:sp>
         <p:nvSpPr>
-          <p:cNvPr id="95" name="TextBox 11"/>
+          <p:cNvPr id="95" name="bowl_name"/>
           <p:cNvSpPr txBox="1"/>
           <p:nvPr/>
         </p:nvSpPr>
@@ -2917,7 +2921,7 @@
       </p:sp>
       <p:sp>
         <p:nvSpPr>
-          <p:cNvPr id="96" name="TextBox 12"/>
+          <p:cNvPr id="96" name="best_before"/>
           <p:cNvSpPr txBox="1"/>
           <p:nvPr/>
         </p:nvSpPr>
@@ -2966,7 +2970,7 @@
       </p:sp>
       <p:sp>
         <p:nvSpPr>
-          <p:cNvPr id="97" name="TextBox 13"/>
+          <p:cNvPr id="97" name="client_name"/>
           <p:cNvSpPr txBox="1"/>
           <p:nvPr/>
         </p:nvSpPr>
@@ -3015,7 +3019,7 @@
       </p:sp>
       <p:sp>
         <p:nvSpPr>
-          <p:cNvPr id="98" name="TextBox 13"/>
+          <p:cNvPr id="98" name="meal"/>
           <p:cNvSpPr txBox="1"/>
           <p:nvPr/>
         </p:nvSpPr>
@@ -3057,6 +3061,61 @@
             <a:r>
               <a:rPr lang="en-US" dirty="0"/>
               <a:t>meal</a:t>
+            </a:r>
+            <a:endParaRPr dirty="0"/>
+          </a:p>
+        </p:txBody>
+      </p:sp>
+      <p:sp>
+        <p:nvSpPr>
+          <p:cNvPr id="2" name="zone">
+            <a:extLst>
+              <a:ext uri="{FF2B5EF4-FFF2-40B4-BE49-F238E27FC236}">
+                <a16:creationId xmlns:a16="http://schemas.microsoft.com/office/drawing/2014/main" id="{2B4D0421-462A-8311-02C3-F8F5E812DF42}"/>
+              </a:ext>
+            </a:extLst>
+          </p:cNvPr>
+          <p:cNvSpPr txBox="1"/>
+          <p:nvPr/>
+        </p:nvSpPr>
+        <p:spPr>
+          <a:xfrm>
+            <a:off x="928857" y="497727"/>
+            <a:ext cx="2181496" cy="149593"/>
+          </a:xfrm>
+          <a:prstGeom prst="rect">
+            <a:avLst/>
+          </a:prstGeom>
+          <a:ln w="12700">
+            <a:miter lim="400000"/>
+          </a:ln>
+          <a:extLst>
+            <a:ext uri="{C572A759-6A51-4108-AA02-DFA0A04FC94B}">
+              <ma14:wrappingTextBoxFlag xmlns="" xmlns:m="http://schemas.openxmlformats.org/officeDocument/2006/math" xmlns:a14="http://schemas.microsoft.com/office/drawing/2010/main" xmlns:ma14="http://schemas.microsoft.com/office/mac/drawingml/2011/main" val="1"/>
+            </a:ext>
+          </a:extLst>
+        </p:spPr>
+        <p:txBody>
+          <a:bodyPr lIns="0" tIns="0" rIns="0" bIns="0">
+            <a:spAutoFit/>
+          </a:bodyPr>
+          <a:lstStyle>
+            <a:lvl1pPr algn="r">
+              <a:lnSpc>
+                <a:spcPts val="1300"/>
+              </a:lnSpc>
+              <a:defRPr sz="900">
+                <a:latin typeface="Lato"/>
+                <a:ea typeface="Lato"/>
+                <a:cs typeface="Lato"/>
+                <a:sym typeface="Lato"/>
+              </a:defRPr>
+            </a:lvl1pPr>
+          </a:lstStyle>
+          <a:p>
+            <a:r>
+              <a:rPr lang="en-US" dirty="0"/>
+              <a:t>zone</a:t>
             </a:r>
             <a:endParaRPr dirty="0"/>
           </a:p>

</xml_diff>

<commit_message>
update dish sticker and one sheeter with parts
</commit_message>
<xml_diff>
--- a/template/Dish_Sticker_Template_Barcode.pptx
+++ b/template/Dish_Sticker_Template_Barcode.pptx
@@ -316,6 +316,115 @@
     </p:ext>
   </p:extLst>
 </p:presentation>
+</file>
+
+<file path=ppt/revisionInfo.xml><?xml version="1.0" encoding="utf-8"?>
+<p1510:revInfo xmlns:a="http://schemas.openxmlformats.org/drawingml/2006/main" xmlns:r="http://schemas.openxmlformats.org/officeDocument/2006/relationships" xmlns:p1510="http://schemas.microsoft.com/office/powerpoint/2015/10/main">
+  <p1510:revLst>
+    <p1510:client id="{B228A49B-B19C-424F-8D7C-1C3BB010AF04}" v="1" dt="2026-01-09T23:28:18.686"/>
+  </p1510:revLst>
+</p1510:revInfo>
+</file>
+
+<file path=ppt/changesInfos/changesInfo1.xml><?xml version="1.0" encoding="utf-8"?>
+<pc:chgInfo xmlns:a="http://schemas.openxmlformats.org/drawingml/2006/main" xmlns:r="http://schemas.openxmlformats.org/officeDocument/2006/relationships" xmlns:ac="http://schemas.microsoft.com/office/drawing/2013/main/command" xmlns:pc="http://schemas.microsoft.com/office/powerpoint/2013/main/command">
+  <pc:docChgLst>
+    <pc:chgData name="Yang Chen" userId="5efd7b53-582d-4367-abd9-b7e0599e7d94" providerId="ADAL" clId="{B228A49B-B19C-424F-8D7C-1C3BB010AF04}"/>
+    <pc:docChg chg="modSld">
+      <pc:chgData name="Yang Chen" userId="5efd7b53-582d-4367-abd9-b7e0599e7d94" providerId="ADAL" clId="{B228A49B-B19C-424F-8D7C-1C3BB010AF04}" dt="2026-01-09T23:28:18.685" v="8" actId="962"/>
+      <pc:docMkLst>
+        <pc:docMk/>
+      </pc:docMkLst>
+      <pc:sldChg chg="addSp modSp mod">
+        <pc:chgData name="Yang Chen" userId="5efd7b53-582d-4367-abd9-b7e0599e7d94" providerId="ADAL" clId="{B228A49B-B19C-424F-8D7C-1C3BB010AF04}" dt="2026-01-09T23:28:18.685" v="8" actId="962"/>
+        <pc:sldMkLst>
+          <pc:docMk/>
+          <pc:sldMk cId="0" sldId="256"/>
+        </pc:sldMkLst>
+        <pc:spChg chg="add mod">
+          <ac:chgData name="Yang Chen" userId="5efd7b53-582d-4367-abd9-b7e0599e7d94" providerId="ADAL" clId="{B228A49B-B19C-424F-8D7C-1C3BB010AF04}" dt="2026-01-09T23:28:18.685" v="8" actId="962"/>
+          <ac:spMkLst>
+            <pc:docMk/>
+            <pc:sldMk cId="0" sldId="256"/>
+            <ac:spMk id="4" creationId="{40943AAF-D767-E78E-DE58-3340D4090504}"/>
+          </ac:spMkLst>
+        </pc:spChg>
+        <pc:spChg chg="mod">
+          <ac:chgData name="Yang Chen" userId="5efd7b53-582d-4367-abd9-b7e0599e7d94" providerId="ADAL" clId="{B228A49B-B19C-424F-8D7C-1C3BB010AF04}" dt="2026-01-09T23:27:21.546" v="2" actId="113"/>
+          <ac:spMkLst>
+            <pc:docMk/>
+            <pc:sldMk cId="0" sldId="256"/>
+            <ac:spMk id="95" creationId="{00000000-0000-0000-0000-000000000000}"/>
+          </ac:spMkLst>
+        </pc:spChg>
+      </pc:sldChg>
+    </pc:docChg>
+  </pc:docChgLst>
+  <pc:docChgLst>
+    <pc:chgData name="Yang Chen" userId="5efd7b53-582d-4367-abd9-b7e0599e7d94" providerId="ADAL" clId="{8AEC8109-A2A2-B342-9A56-ABFCCABF40EF}"/>
+    <pc:docChg chg="modSld">
+      <pc:chgData name="Yang Chen" userId="5efd7b53-582d-4367-abd9-b7e0599e7d94" providerId="ADAL" clId="{8AEC8109-A2A2-B342-9A56-ABFCCABF40EF}" dt="2025-11-08T19:30:45.094" v="11" actId="962"/>
+      <pc:docMkLst>
+        <pc:docMk/>
+      </pc:docMkLst>
+      <pc:sldChg chg="modSp">
+        <pc:chgData name="Yang Chen" userId="5efd7b53-582d-4367-abd9-b7e0599e7d94" providerId="ADAL" clId="{8AEC8109-A2A2-B342-9A56-ABFCCABF40EF}" dt="2025-11-08T19:30:45.094" v="11" actId="962"/>
+        <pc:sldMkLst>
+          <pc:docMk/>
+          <pc:sldMk cId="0" sldId="256"/>
+        </pc:sldMkLst>
+        <pc:spChg chg="mod">
+          <ac:chgData name="Yang Chen" userId="5efd7b53-582d-4367-abd9-b7e0599e7d94" providerId="ADAL" clId="{8AEC8109-A2A2-B342-9A56-ABFCCABF40EF}" dt="2025-11-08T19:30:00.002" v="6" actId="962"/>
+          <ac:spMkLst>
+            <pc:docMk/>
+            <pc:sldMk cId="0" sldId="256"/>
+            <ac:spMk id="2" creationId="{2B4D0421-462A-8311-02C3-F8F5E812DF42}"/>
+          </ac:spMkLst>
+        </pc:spChg>
+        <pc:spChg chg="mod">
+          <ac:chgData name="Yang Chen" userId="5efd7b53-582d-4367-abd9-b7e0599e7d94" providerId="ADAL" clId="{8AEC8109-A2A2-B342-9A56-ABFCCABF40EF}" dt="2025-11-08T19:30:45.094" v="11" actId="962"/>
+          <ac:spMkLst>
+            <pc:docMk/>
+            <pc:sldMk cId="0" sldId="256"/>
+            <ac:spMk id="94" creationId="{00000000-0000-0000-0000-000000000000}"/>
+          </ac:spMkLst>
+        </pc:spChg>
+        <pc:spChg chg="mod">
+          <ac:chgData name="Yang Chen" userId="5efd7b53-582d-4367-abd9-b7e0599e7d94" providerId="ADAL" clId="{8AEC8109-A2A2-B342-9A56-ABFCCABF40EF}" dt="2025-11-08T19:30:41.678" v="10" actId="962"/>
+          <ac:spMkLst>
+            <pc:docMk/>
+            <pc:sldMk cId="0" sldId="256"/>
+            <ac:spMk id="95" creationId="{00000000-0000-0000-0000-000000000000}"/>
+          </ac:spMkLst>
+        </pc:spChg>
+        <pc:spChg chg="mod">
+          <ac:chgData name="Yang Chen" userId="5efd7b53-582d-4367-abd9-b7e0599e7d94" providerId="ADAL" clId="{8AEC8109-A2A2-B342-9A56-ABFCCABF40EF}" dt="2025-11-08T19:30:38.085" v="9" actId="962"/>
+          <ac:spMkLst>
+            <pc:docMk/>
+            <pc:sldMk cId="0" sldId="256"/>
+            <ac:spMk id="96" creationId="{00000000-0000-0000-0000-000000000000}"/>
+          </ac:spMkLst>
+        </pc:spChg>
+        <pc:spChg chg="mod">
+          <ac:chgData name="Yang Chen" userId="5efd7b53-582d-4367-abd9-b7e0599e7d94" providerId="ADAL" clId="{8AEC8109-A2A2-B342-9A56-ABFCCABF40EF}" dt="2025-11-08T19:30:34.072" v="8" actId="962"/>
+          <ac:spMkLst>
+            <pc:docMk/>
+            <pc:sldMk cId="0" sldId="256"/>
+            <ac:spMk id="97" creationId="{00000000-0000-0000-0000-000000000000}"/>
+          </ac:spMkLst>
+        </pc:spChg>
+        <pc:spChg chg="mod">
+          <ac:chgData name="Yang Chen" userId="5efd7b53-582d-4367-abd9-b7e0599e7d94" providerId="ADAL" clId="{8AEC8109-A2A2-B342-9A56-ABFCCABF40EF}" dt="2025-11-08T19:30:00.208" v="7" actId="962"/>
+          <ac:spMkLst>
+            <pc:docMk/>
+            <pc:sldMk cId="0" sldId="256"/>
+            <ac:spMk id="98" creationId="{00000000-0000-0000-0000-000000000000}"/>
+          </ac:spMkLst>
+        </pc:spChg>
+      </pc:sldChg>
+    </pc:docChg>
+  </pc:docChgLst>
+</pc:chgInfo>
 </file>
 
 <file path=ppt/notesMasters/notesMaster1.xml><?xml version="1.0" encoding="utf-8"?>
@@ -2912,10 +3021,10 @@
               </a:lnSpc>
             </a:pPr>
             <a:r>
-              <a:rPr b="0" dirty="0" err="1"/>
+              <a:rPr dirty="0" err="1"/>
               <a:t>bowl_name</a:t>
             </a:r>
-            <a:endParaRPr b="0" dirty="0"/>
+            <a:endParaRPr dirty="0"/>
           </a:p>
         </p:txBody>
       </p:sp>
@@ -3118,6 +3227,80 @@
               <a:t>zone</a:t>
             </a:r>
             <a:endParaRPr dirty="0"/>
+          </a:p>
+        </p:txBody>
+      </p:sp>
+      <p:sp>
+        <p:nvSpPr>
+          <p:cNvPr id="4" name="parts">
+            <a:extLst>
+              <a:ext uri="{FF2B5EF4-FFF2-40B4-BE49-F238E27FC236}">
+                <a16:creationId xmlns:a16="http://schemas.microsoft.com/office/drawing/2014/main" id="{40943AAF-D767-E78E-DE58-3340D4090504}"/>
+              </a:ext>
+            </a:extLst>
+          </p:cNvPr>
+          <p:cNvSpPr txBox="1"/>
+          <p:nvPr/>
+        </p:nvSpPr>
+        <p:spPr>
+          <a:xfrm>
+            <a:off x="1325428" y="1181529"/>
+            <a:ext cx="638443" cy="369332"/>
+          </a:xfrm>
+          <a:prstGeom prst="rect">
+            <a:avLst/>
+          </a:prstGeom>
+          <a:noFill/>
+          <a:ln w="12700" cap="flat">
+            <a:noFill/>
+            <a:miter lim="400000"/>
+          </a:ln>
+          <a:effectLst/>
+          <a:sp3d/>
+        </p:spPr>
+        <p:style>
+          <a:lnRef idx="0">
+            <a:scrgbClr r="0" g="0" b="0"/>
+          </a:lnRef>
+          <a:fillRef idx="0">
+            <a:scrgbClr r="0" g="0" b="0"/>
+          </a:fillRef>
+          <a:effectRef idx="0">
+            <a:scrgbClr r="0" g="0" b="0"/>
+          </a:effectRef>
+          <a:fontRef idx="none"/>
+        </p:style>
+        <p:txBody>
+          <a:bodyPr wrap="square">
+            <a:spAutoFit/>
+          </a:bodyPr>
+          <a:lstStyle/>
+          <a:p>
+            <a:pPr algn="ctr" rtl="0">
+              <a:buNone/>
+            </a:pPr>
+            <a:r>
+              <a:rPr lang="en-US" sz="600" b="0" i="0" u="none" strike="noStrike" dirty="0">
+                <a:solidFill>
+                  <a:srgbClr val="000000"/>
+                </a:solidFill>
+                <a:effectLst/>
+                <a:latin typeface="Calibri" panose="020F0502020204030204" pitchFamily="34" charset="0"/>
+              </a:rPr>
+              <a:t>PART 1/2</a:t>
+            </a:r>
+            <a:endParaRPr lang="en-US" sz="600" b="0" dirty="0">
+              <a:effectLst/>
+            </a:endParaRPr>
+          </a:p>
+          <a:p>
+            <a:pPr>
+              <a:buNone/>
+            </a:pPr>
+            <a:br>
+              <a:rPr lang="en-US" sz="600" dirty="0"/>
+            </a:br>
+            <a:endParaRPr lang="en-US" sz="600" dirty="0"/>
           </a:p>
         </p:txBody>
       </p:sp>

</xml_diff>